<commit_message>
oprava zadání url v linkgeneratoru
</commit_message>
<xml_diff>
--- a/07-fb-uzivatele/notes4-obnova-hesla-dokonceni.pptx
+++ b/07-fb-uzivatele/notes4-obnova-hesla-dokonceni.pptx
@@ -110,6 +110,11 @@
       </a:defRPr>
     </a:lvl9pPr>
   </p:defaultTextStyle>
+  <p:extLst>
+    <p:ext uri="{EFAFB233-063F-42B5-8137-9DF3F51BA10A}">
+      <p15:sldGuideLst xmlns:p15="http://schemas.microsoft.com/office/powerpoint/2012/main"/>
+    </p:ext>
+  </p:extLst>
 </p:presentation>
 </file>
 
@@ -260,7 +265,7 @@
           <a:p>
             <a:fld id="{5D3DCD58-1695-494E-AA4E-AEBEE234130A}" type="datetimeFigureOut">
               <a:rPr lang="cs-CZ" smtClean="0"/>
-              <a:t>13.11.2021</a:t>
+              <a:t>17.11.2022</a:t>
             </a:fld>
             <a:endParaRPr lang="cs-CZ"/>
           </a:p>
@@ -458,7 +463,7 @@
           <a:p>
             <a:fld id="{5D3DCD58-1695-494E-AA4E-AEBEE234130A}" type="datetimeFigureOut">
               <a:rPr lang="cs-CZ" smtClean="0"/>
-              <a:t>13.11.2021</a:t>
+              <a:t>17.11.2022</a:t>
             </a:fld>
             <a:endParaRPr lang="cs-CZ"/>
           </a:p>
@@ -666,7 +671,7 @@
           <a:p>
             <a:fld id="{5D3DCD58-1695-494E-AA4E-AEBEE234130A}" type="datetimeFigureOut">
               <a:rPr lang="cs-CZ" smtClean="0"/>
-              <a:t>13.11.2021</a:t>
+              <a:t>17.11.2022</a:t>
             </a:fld>
             <a:endParaRPr lang="cs-CZ"/>
           </a:p>
@@ -864,7 +869,7 @@
           <a:p>
             <a:fld id="{5D3DCD58-1695-494E-AA4E-AEBEE234130A}" type="datetimeFigureOut">
               <a:rPr lang="cs-CZ" smtClean="0"/>
-              <a:t>13.11.2021</a:t>
+              <a:t>17.11.2022</a:t>
             </a:fld>
             <a:endParaRPr lang="cs-CZ"/>
           </a:p>
@@ -1139,7 +1144,7 @@
           <a:p>
             <a:fld id="{5D3DCD58-1695-494E-AA4E-AEBEE234130A}" type="datetimeFigureOut">
               <a:rPr lang="cs-CZ" smtClean="0"/>
-              <a:t>13.11.2021</a:t>
+              <a:t>17.11.2022</a:t>
             </a:fld>
             <a:endParaRPr lang="cs-CZ"/>
           </a:p>
@@ -1404,7 +1409,7 @@
           <a:p>
             <a:fld id="{5D3DCD58-1695-494E-AA4E-AEBEE234130A}" type="datetimeFigureOut">
               <a:rPr lang="cs-CZ" smtClean="0"/>
-              <a:t>13.11.2021</a:t>
+              <a:t>17.11.2022</a:t>
             </a:fld>
             <a:endParaRPr lang="cs-CZ"/>
           </a:p>
@@ -1816,7 +1821,7 @@
           <a:p>
             <a:fld id="{5D3DCD58-1695-494E-AA4E-AEBEE234130A}" type="datetimeFigureOut">
               <a:rPr lang="cs-CZ" smtClean="0"/>
-              <a:t>13.11.2021</a:t>
+              <a:t>17.11.2022</a:t>
             </a:fld>
             <a:endParaRPr lang="cs-CZ"/>
           </a:p>
@@ -1957,7 +1962,7 @@
           <a:p>
             <a:fld id="{5D3DCD58-1695-494E-AA4E-AEBEE234130A}" type="datetimeFigureOut">
               <a:rPr lang="cs-CZ" smtClean="0"/>
-              <a:t>13.11.2021</a:t>
+              <a:t>17.11.2022</a:t>
             </a:fld>
             <a:endParaRPr lang="cs-CZ"/>
           </a:p>
@@ -2070,7 +2075,7 @@
           <a:p>
             <a:fld id="{5D3DCD58-1695-494E-AA4E-AEBEE234130A}" type="datetimeFigureOut">
               <a:rPr lang="cs-CZ" smtClean="0"/>
-              <a:t>13.11.2021</a:t>
+              <a:t>17.11.2022</a:t>
             </a:fld>
             <a:endParaRPr lang="cs-CZ"/>
           </a:p>
@@ -2381,7 +2386,7 @@
           <a:p>
             <a:fld id="{5D3DCD58-1695-494E-AA4E-AEBEE234130A}" type="datetimeFigureOut">
               <a:rPr lang="cs-CZ" smtClean="0"/>
-              <a:t>13.11.2021</a:t>
+              <a:t>17.11.2022</a:t>
             </a:fld>
             <a:endParaRPr lang="cs-CZ"/>
           </a:p>
@@ -2669,7 +2674,7 @@
           <a:p>
             <a:fld id="{5D3DCD58-1695-494E-AA4E-AEBEE234130A}" type="datetimeFigureOut">
               <a:rPr lang="cs-CZ" smtClean="0"/>
-              <a:t>13.11.2021</a:t>
+              <a:t>17.11.2022</a:t>
             </a:fld>
             <a:endParaRPr lang="cs-CZ"/>
           </a:p>
@@ -2910,7 +2915,7 @@
           <a:p>
             <a:fld id="{5D3DCD58-1695-494E-AA4E-AEBEE234130A}" type="datetimeFigureOut">
               <a:rPr lang="cs-CZ" smtClean="0"/>
-              <a:t>13.11.2021</a:t>
+              <a:t>17.11.2022</a:t>
             </a:fld>
             <a:endParaRPr lang="cs-CZ"/>
           </a:p>
@@ -4517,10 +4522,10 @@
       </p:sp>
       <p:pic>
         <p:nvPicPr>
-          <p:cNvPr id="7" name="Obrázek 6">
-            <a:extLst>
-              <a:ext uri="{FF2B5EF4-FFF2-40B4-BE49-F238E27FC236}">
-                <a16:creationId xmlns:a16="http://schemas.microsoft.com/office/drawing/2014/main" id="{F0DC687E-D03B-4FCF-8DDC-29AB0117D371}"/>
+          <p:cNvPr id="5" name="Obrázek 4">
+            <a:extLst>
+              <a:ext uri="{FF2B5EF4-FFF2-40B4-BE49-F238E27FC236}">
+                <a16:creationId xmlns:a16="http://schemas.microsoft.com/office/drawing/2014/main" id="{024D3525-C922-4FC6-9BDC-0C1176BFEC79}"/>
               </a:ext>
             </a:extLst>
           </p:cNvPr>
@@ -4537,8 +4542,8 @@
         </p:blipFill>
         <p:spPr>
           <a:xfrm>
-            <a:off x="0" y="180180"/>
-            <a:ext cx="12192000" cy="6497640"/>
+            <a:off x="0" y="180975"/>
+            <a:ext cx="12192000" cy="6496050"/>
           </a:xfrm>
           <a:prstGeom prst="rect">
             <a:avLst/>

</xml_diff>